<commit_message>
updating with Nokia-bell-labs status
</commit_message>
<xml_diff>
--- a/images/logo/logo.pptx
+++ b/images/logo/logo.pptx
@@ -5,11 +5,12 @@
     <p:sldMasterId id="2147483648" r:id="rId1"/>
   </p:sldMasterIdLst>
   <p:notesMasterIdLst>
-    <p:notesMasterId r:id="rId4"/>
+    <p:notesMasterId r:id="rId5"/>
   </p:notesMasterIdLst>
   <p:sldIdLst>
     <p:sldId id="257" r:id="rId2"/>
     <p:sldId id="258" r:id="rId3"/>
+    <p:sldId id="259" r:id="rId4"/>
   </p:sldIdLst>
   <p:sldSz cx="12192000" cy="6858000"/>
   <p:notesSz cx="6858000" cy="9144000"/>
@@ -108,6 +109,11 @@
       </a:defRPr>
     </a:lvl9pPr>
   </p:defaultTextStyle>
+  <p:extLst>
+    <p:ext uri="{EFAFB233-063F-42B5-8137-9DF3F51BA10A}">
+      <p15:sldGuideLst xmlns:p15="http://schemas.microsoft.com/office/powerpoint/2012/main"/>
+    </p:ext>
+  </p:extLst>
 </p:presentation>
 </file>
 
@@ -193,7 +199,7 @@
           <a:p>
             <a:fld id="{744EEEC0-D9D0-45EB-8449-095143EB1D64}" type="datetimeFigureOut">
               <a:rPr lang="en-IE" smtClean="0"/>
-              <a:t>14/03/2023</a:t>
+              <a:t>07/04/2023</a:t>
             </a:fld>
             <a:endParaRPr lang="en-IE"/>
           </a:p>
@@ -694,7 +700,7 @@
           <a:p>
             <a:fld id="{454286B8-542B-4254-81AF-4BB6BC59B692}" type="datetimeFigureOut">
               <a:rPr lang="en-IE" smtClean="0"/>
-              <a:t>14/03/2023</a:t>
+              <a:t>07/04/2023</a:t>
             </a:fld>
             <a:endParaRPr lang="en-IE"/>
           </a:p>
@@ -894,7 +900,7 @@
           <a:p>
             <a:fld id="{454286B8-542B-4254-81AF-4BB6BC59B692}" type="datetimeFigureOut">
               <a:rPr lang="en-IE" smtClean="0"/>
-              <a:t>14/03/2023</a:t>
+              <a:t>07/04/2023</a:t>
             </a:fld>
             <a:endParaRPr lang="en-IE"/>
           </a:p>
@@ -1104,7 +1110,7 @@
           <a:p>
             <a:fld id="{454286B8-542B-4254-81AF-4BB6BC59B692}" type="datetimeFigureOut">
               <a:rPr lang="en-IE" smtClean="0"/>
-              <a:t>14/03/2023</a:t>
+              <a:t>07/04/2023</a:t>
             </a:fld>
             <a:endParaRPr lang="en-IE"/>
           </a:p>
@@ -1304,7 +1310,7 @@
           <a:p>
             <a:fld id="{454286B8-542B-4254-81AF-4BB6BC59B692}" type="datetimeFigureOut">
               <a:rPr lang="en-IE" smtClean="0"/>
-              <a:t>14/03/2023</a:t>
+              <a:t>07/04/2023</a:t>
             </a:fld>
             <a:endParaRPr lang="en-IE"/>
           </a:p>
@@ -1580,7 +1586,7 @@
           <a:p>
             <a:fld id="{454286B8-542B-4254-81AF-4BB6BC59B692}" type="datetimeFigureOut">
               <a:rPr lang="en-IE" smtClean="0"/>
-              <a:t>14/03/2023</a:t>
+              <a:t>07/04/2023</a:t>
             </a:fld>
             <a:endParaRPr lang="en-IE"/>
           </a:p>
@@ -1848,7 +1854,7 @@
           <a:p>
             <a:fld id="{454286B8-542B-4254-81AF-4BB6BC59B692}" type="datetimeFigureOut">
               <a:rPr lang="en-IE" smtClean="0"/>
-              <a:t>14/03/2023</a:t>
+              <a:t>07/04/2023</a:t>
             </a:fld>
             <a:endParaRPr lang="en-IE"/>
           </a:p>
@@ -2263,7 +2269,7 @@
           <a:p>
             <a:fld id="{454286B8-542B-4254-81AF-4BB6BC59B692}" type="datetimeFigureOut">
               <a:rPr lang="en-IE" smtClean="0"/>
-              <a:t>14/03/2023</a:t>
+              <a:t>07/04/2023</a:t>
             </a:fld>
             <a:endParaRPr lang="en-IE"/>
           </a:p>
@@ -2405,7 +2411,7 @@
           <a:p>
             <a:fld id="{454286B8-542B-4254-81AF-4BB6BC59B692}" type="datetimeFigureOut">
               <a:rPr lang="en-IE" smtClean="0"/>
-              <a:t>14/03/2023</a:t>
+              <a:t>07/04/2023</a:t>
             </a:fld>
             <a:endParaRPr lang="en-IE"/>
           </a:p>
@@ -2518,7 +2524,7 @@
           <a:p>
             <a:fld id="{454286B8-542B-4254-81AF-4BB6BC59B692}" type="datetimeFigureOut">
               <a:rPr lang="en-IE" smtClean="0"/>
-              <a:t>14/03/2023</a:t>
+              <a:t>07/04/2023</a:t>
             </a:fld>
             <a:endParaRPr lang="en-IE"/>
           </a:p>
@@ -2831,7 +2837,7 @@
           <a:p>
             <a:fld id="{454286B8-542B-4254-81AF-4BB6BC59B692}" type="datetimeFigureOut">
               <a:rPr lang="en-IE" smtClean="0"/>
-              <a:t>14/03/2023</a:t>
+              <a:t>07/04/2023</a:t>
             </a:fld>
             <a:endParaRPr lang="en-IE"/>
           </a:p>
@@ -3120,7 +3126,7 @@
           <a:p>
             <a:fld id="{454286B8-542B-4254-81AF-4BB6BC59B692}" type="datetimeFigureOut">
               <a:rPr lang="en-IE" smtClean="0"/>
-              <a:t>14/03/2023</a:t>
+              <a:t>07/04/2023</a:t>
             </a:fld>
             <a:endParaRPr lang="en-IE"/>
           </a:p>
@@ -3363,7 +3369,7 @@
           <a:p>
             <a:fld id="{454286B8-542B-4254-81AF-4BB6BC59B692}" type="datetimeFigureOut">
               <a:rPr lang="en-IE" smtClean="0"/>
-              <a:t>14/03/2023</a:t>
+              <a:t>07/04/2023</a:t>
             </a:fld>
             <a:endParaRPr lang="en-IE"/>
           </a:p>
@@ -4365,6 +4371,146 @@
     <p:extLst>
       <p:ext uri="{BB962C8B-B14F-4D97-AF65-F5344CB8AC3E}">
         <p14:creationId xmlns:p14="http://schemas.microsoft.com/office/powerpoint/2010/main" val="3140625213"/>
+      </p:ext>
+    </p:extLst>
+  </p:cSld>
+  <p:clrMapOvr>
+    <a:masterClrMapping/>
+  </p:clrMapOvr>
+</p:sld>
+</file>
+
+<file path=ppt/slides/slide3.xml><?xml version="1.0" encoding="utf-8"?>
+<p:sld xmlns:a="http://schemas.openxmlformats.org/drawingml/2006/main" xmlns:r="http://schemas.openxmlformats.org/officeDocument/2006/relationships" xmlns:p="http://schemas.openxmlformats.org/presentationml/2006/main">
+  <p:cSld>
+    <p:spTree>
+      <p:nvGrpSpPr>
+        <p:cNvPr id="1" name=""/>
+        <p:cNvGrpSpPr/>
+        <p:nvPr/>
+      </p:nvGrpSpPr>
+      <p:grpSpPr>
+        <a:xfrm>
+          <a:off x="0" y="0"/>
+          <a:ext cx="0" cy="0"/>
+          <a:chOff x="0" y="0"/>
+          <a:chExt cx="0" cy="0"/>
+        </a:xfrm>
+      </p:grpSpPr>
+      <p:grpSp>
+        <p:nvGrpSpPr>
+          <p:cNvPr id="6" name="Group 5">
+            <a:extLst>
+              <a:ext uri="{FF2B5EF4-FFF2-40B4-BE49-F238E27FC236}">
+                <a16:creationId xmlns:a16="http://schemas.microsoft.com/office/drawing/2014/main" id="{E7A8767A-3EC8-6D48-9F99-CCE44FC9B297}"/>
+              </a:ext>
+            </a:extLst>
+          </p:cNvPr>
+          <p:cNvGrpSpPr/>
+          <p:nvPr/>
+        </p:nvGrpSpPr>
+        <p:grpSpPr>
+          <a:xfrm>
+            <a:off x="1080743" y="534473"/>
+            <a:ext cx="3204000" cy="3204000"/>
+            <a:chOff x="1080743" y="534473"/>
+            <a:chExt cx="3204000" cy="3204000"/>
+          </a:xfrm>
+        </p:grpSpPr>
+        <p:sp>
+          <p:nvSpPr>
+            <p:cNvPr id="3" name="Oval 2">
+              <a:extLst>
+                <a:ext uri="{FF2B5EF4-FFF2-40B4-BE49-F238E27FC236}">
+                  <a16:creationId xmlns:a16="http://schemas.microsoft.com/office/drawing/2014/main" id="{2AAAF7C0-B63D-0B8C-6583-C587B43C1A16}"/>
+                </a:ext>
+              </a:extLst>
+            </p:cNvPr>
+            <p:cNvSpPr/>
+            <p:nvPr/>
+          </p:nvSpPr>
+          <p:spPr>
+            <a:xfrm>
+              <a:off x="1080743" y="534473"/>
+              <a:ext cx="3204000" cy="3204000"/>
+            </a:xfrm>
+            <a:prstGeom prst="ellipse">
+              <a:avLst/>
+            </a:prstGeom>
+            <a:solidFill>
+              <a:schemeClr val="bg1"/>
+            </a:solidFill>
+            <a:ln w="57150">
+              <a:solidFill>
+                <a:schemeClr val="tx1"/>
+              </a:solidFill>
+            </a:ln>
+          </p:spPr>
+          <p:style>
+            <a:lnRef idx="2">
+              <a:schemeClr val="accent1">
+                <a:shade val="50000"/>
+              </a:schemeClr>
+            </a:lnRef>
+            <a:fillRef idx="1">
+              <a:schemeClr val="accent1"/>
+            </a:fillRef>
+            <a:effectRef idx="0">
+              <a:schemeClr val="accent1"/>
+            </a:effectRef>
+            <a:fontRef idx="minor">
+              <a:schemeClr val="lt1"/>
+            </a:fontRef>
+          </p:style>
+          <p:txBody>
+            <a:bodyPr rtlCol="0" anchor="ctr"/>
+            <a:lstStyle/>
+            <a:p>
+              <a:pPr algn="ctr"/>
+              <a:endParaRPr lang="en-IE" dirty="0"/>
+            </a:p>
+          </p:txBody>
+        </p:sp>
+        <p:pic>
+          <p:nvPicPr>
+            <p:cNvPr id="4" name="Picture 3">
+              <a:extLst>
+                <a:ext uri="{FF2B5EF4-FFF2-40B4-BE49-F238E27FC236}">
+                  <a16:creationId xmlns:a16="http://schemas.microsoft.com/office/drawing/2014/main" id="{74CB4C90-F92B-57E2-3821-C9F1E92230E3}"/>
+                </a:ext>
+              </a:extLst>
+            </p:cNvPr>
+            <p:cNvPicPr>
+              <a:picLocks noChangeAspect="1"/>
+            </p:cNvPicPr>
+            <p:nvPr/>
+          </p:nvPicPr>
+          <p:blipFill rotWithShape="1">
+            <a:blip r:embed="rId2">
+              <a:extLst>
+                <a:ext uri="{28A0092B-C50C-407E-A947-70E740481C1C}">
+                  <a14:useLocalDpi xmlns:a14="http://schemas.microsoft.com/office/drawing/2010/main" val="0"/>
+                </a:ext>
+              </a:extLst>
+            </a:blip>
+            <a:srcRect l="13978" r="14530"/>
+            <a:stretch/>
+          </p:blipFill>
+          <p:spPr>
+            <a:xfrm>
+              <a:off x="1506828" y="1141044"/>
+              <a:ext cx="2442693" cy="1990858"/>
+            </a:xfrm>
+            <a:prstGeom prst="rect">
+              <a:avLst/>
+            </a:prstGeom>
+          </p:spPr>
+        </p:pic>
+      </p:grpSp>
+    </p:spTree>
+    <p:extLst>
+      <p:ext uri="{BB962C8B-B14F-4D97-AF65-F5344CB8AC3E}">
+        <p14:creationId xmlns:p14="http://schemas.microsoft.com/office/powerpoint/2010/main" val="4277113703"/>
       </p:ext>
     </p:extLst>
   </p:cSld>

</xml_diff>